<commit_message>
SC-27: update text of master shape
</commit_message>
<xml_diff>
--- a/ShapeCrawler.Tests/Resource/autoshape/autoshape-case001.pptx
+++ b/ShapeCrawler.Tests/Resource/autoshape/autoshape-case001.pptx
@@ -2790,7 +2790,7 @@
           <a:p>
             <a:fld id="{397FB4C9-79EF-46E6-AA44-D70234A49E6A}" type="datetimeFigureOut">
               <a:rPr lang="en-US" smtClean="0"/>
-              <a:t>8/30/2022</a:t>
+              <a:t>9/3/2022</a:t>
             </a:fld>
             <a:endParaRPr lang="en-US"/>
           </a:p>
@@ -2955,7 +2955,7 @@
           <a:p>
             <a:fld id="{1E372339-244B-4739-93B1-E07D27C1A885}" type="datetimeFigureOut">
               <a:rPr lang="en-US" smtClean="0"/>
-              <a:t>8/30/2022</a:t>
+              <a:t>9/3/2022</a:t>
             </a:fld>
             <a:endParaRPr lang="en-US"/>
           </a:p>
@@ -3407,7 +3407,7 @@
           <a:p>
             <a:fld id="{E0D67433-29F8-476F-93C3-1F6C453B7117}" type="datetime1">
               <a:rPr lang="en-US" smtClean="0"/>
-              <a:t>8/30/2022</a:t>
+              <a:t>9/3/2022</a:t>
             </a:fld>
             <a:endParaRPr lang="en-US"/>
           </a:p>
@@ -3591,7 +3591,7 @@
           <a:p>
             <a:fld id="{54DFF0A4-A598-4C87-8B26-D50B23B00F4B}" type="datetime1">
               <a:rPr lang="en-US" smtClean="0"/>
-              <a:t>8/30/2022</a:t>
+              <a:t>9/3/2022</a:t>
             </a:fld>
             <a:endParaRPr lang="en-US"/>
           </a:p>
@@ -3785,7 +3785,7 @@
           <a:p>
             <a:fld id="{C3E5614E-255C-4A03-A948-541978C596DE}" type="datetime1">
               <a:rPr lang="en-US" smtClean="0"/>
-              <a:t>8/30/2022</a:t>
+              <a:t>9/3/2022</a:t>
             </a:fld>
             <a:endParaRPr lang="en-US"/>
           </a:p>
@@ -3969,7 +3969,7 @@
           <a:p>
             <a:fld id="{7390A20F-80B5-4204-947E-94D21F5797EE}" type="datetime1">
               <a:rPr lang="en-US" smtClean="0"/>
-              <a:t>8/30/2022</a:t>
+              <a:t>9/3/2022</a:t>
             </a:fld>
             <a:endParaRPr lang="en-US"/>
           </a:p>
@@ -4230,7 +4230,7 @@
           <a:p>
             <a:fld id="{C208C04C-5557-4648-8075-AE64BC5AF5BB}" type="datetime1">
               <a:rPr lang="en-US" smtClean="0"/>
-              <a:t>8/30/2022</a:t>
+              <a:t>9/3/2022</a:t>
             </a:fld>
             <a:endParaRPr lang="en-US"/>
           </a:p>
@@ -4531,7 +4531,7 @@
           <a:p>
             <a:fld id="{26F8E6D6-2D46-4121-ACC3-8CDA8DD54315}" type="datetime1">
               <a:rPr lang="en-US" smtClean="0"/>
-              <a:t>8/30/2022</a:t>
+              <a:t>9/3/2022</a:t>
             </a:fld>
             <a:endParaRPr lang="en-US"/>
           </a:p>
@@ -4966,7 +4966,7 @@
           <a:p>
             <a:fld id="{4621B255-A872-46E6-8172-8CC4AF78516D}" type="datetime1">
               <a:rPr lang="en-US" smtClean="0"/>
-              <a:t>8/30/2022</a:t>
+              <a:t>9/3/2022</a:t>
             </a:fld>
             <a:endParaRPr lang="en-US"/>
           </a:p>
@@ -5099,7 +5099,7 @@
           <a:p>
             <a:fld id="{E1F7684B-176A-406E-95DA-B09176764703}" type="datetime1">
               <a:rPr lang="en-US" smtClean="0"/>
-              <a:t>8/30/2022</a:t>
+              <a:t>9/3/2022</a:t>
             </a:fld>
             <a:endParaRPr lang="en-US"/>
           </a:p>
@@ -5210,7 +5210,7 @@
           <a:p>
             <a:fld id="{62375D70-0142-4330-9254-D2458B957F7A}" type="datetime1">
               <a:rPr lang="en-US" smtClean="0"/>
-              <a:t>8/30/2022</a:t>
+              <a:t>9/3/2022</a:t>
             </a:fld>
             <a:endParaRPr lang="en-US"/>
           </a:p>
@@ -5501,7 +5501,7 @@
           <a:p>
             <a:fld id="{9EEBA8C6-08D3-4843-AC6D-423C9A41888A}" type="datetime1">
               <a:rPr lang="en-US" smtClean="0"/>
-              <a:t>8/30/2022</a:t>
+              <a:t>9/3/2022</a:t>
             </a:fld>
             <a:endParaRPr lang="en-US"/>
           </a:p>
@@ -5775,7 +5775,7 @@
           <a:p>
             <a:fld id="{538F4F81-DD12-48EB-958D-E8C9A12FDC21}" type="datetime1">
               <a:rPr lang="en-US" smtClean="0"/>
-              <a:t>8/30/2022</a:t>
+              <a:t>9/3/2022</a:t>
             </a:fld>
             <a:endParaRPr lang="en-US"/>
           </a:p>
@@ -5941,8 +5941,8 @@
         </p:nvSpPr>
         <p:spPr bwMode="auto">
           <a:xfrm>
-            <a:off x="457200" y="1600200"/>
-            <a:ext cx="8229600" cy="4525963"/>
+            <a:off x="457200" y="1600201"/>
+            <a:ext cx="8229600" cy="2844478"/>
           </a:xfrm>
           <a:prstGeom prst="rect">
             <a:avLst/>
@@ -6054,7 +6054,7 @@
           <a:p>
             <a:fld id="{39CBC89B-8830-4FA7-9836-C4FF7245E842}" type="datetime1">
               <a:rPr lang="en-US" smtClean="0"/>
-              <a:t>8/30/2022</a:t>
+              <a:t>9/3/2022</a:t>
             </a:fld>
             <a:endParaRPr lang="en-US"/>
           </a:p>
@@ -6262,6 +6262,54 @@
           </a:extLst>
         </p:spPr>
       </p:pic>
+      <p:sp>
+        <p:nvSpPr>
+          <p:cNvPr id="2" name="AutoShape 1">
+            <a:extLst>
+              <a:ext uri="{FF2B5EF4-FFF2-40B4-BE49-F238E27FC236}">
+                <a16:creationId xmlns:a16="http://schemas.microsoft.com/office/drawing/2014/main" id="{F0757CCA-3B35-42F4-B905-1146FD7CF232}"/>
+              </a:ext>
+            </a:extLst>
+          </p:cNvPr>
+          <p:cNvSpPr/>
+          <p:nvPr userDrawn="1"/>
+        </p:nvSpPr>
+        <p:spPr>
+          <a:xfrm>
+            <a:off x="457201" y="4658991"/>
+            <a:ext cx="1302152" cy="451413"/>
+          </a:xfrm>
+          <a:prstGeom prst="rect">
+            <a:avLst/>
+          </a:prstGeom>
+        </p:spPr>
+        <p:style>
+          <a:lnRef idx="1">
+            <a:schemeClr val="accent1"/>
+          </a:lnRef>
+          <a:fillRef idx="3">
+            <a:schemeClr val="accent1"/>
+          </a:fillRef>
+          <a:effectRef idx="2">
+            <a:schemeClr val="accent1"/>
+          </a:effectRef>
+          <a:fontRef idx="minor">
+            <a:schemeClr val="lt1"/>
+          </a:fontRef>
+        </p:style>
+        <p:txBody>
+          <a:bodyPr rtlCol="0" anchor="ctr"/>
+          <a:lstStyle/>
+          <a:p>
+            <a:pPr algn="ctr"/>
+            <a:r>
+              <a:rPr lang="en-US" sz="700" dirty="0"/>
+              <a:t>Master AutoShape</a:t>
+            </a:r>
+            <a:endParaRPr lang="de-DE" sz="700" dirty="0"/>
+          </a:p>
+        </p:txBody>
+      </p:sp>
     </p:spTree>
   </p:cSld>
   <p:clrMap bg1="lt1" tx1="dk1" bg2="lt2" tx2="dk2" accent1="accent1" accent2="accent2" accent3="accent3" accent4="accent4" accent5="accent5" accent6="accent6" hlink="hlink" folHlink="folHlink"/>

</xml_diff>